<commit_message>
Stressed that this session is about the hackathon
</commit_message>
<xml_diff>
--- a/121/nmop-chairs-slides-session-2.pptx
+++ b/121/nmop-chairs-slides-session-2.pptx
@@ -1879,7 +1879,7 @@
             </a:pPr>
             <a:fld id="{00000000-1234-1234-1234-123412341234}" type="slidenum">
               <a:rPr lang="en-US"/>
-              <a:t>‹N°›</a:t>
+              <a:t>‹#›</a:t>
             </a:fld>
             <a:endParaRPr/>
           </a:p>
@@ -2536,7 +2536,7 @@
             </a:pPr>
             <a:fld id="{00000000-1234-1234-1234-123412341234}" type="slidenum">
               <a:rPr lang="en-US"/>
-              <a:t>‹N°›</a:t>
+              <a:t>‹#›</a:t>
             </a:fld>
             <a:endParaRPr/>
           </a:p>
@@ -3772,7 +3772,7 @@
             </a:pPr>
             <a:fld id="{00000000-1234-1234-1234-123412341234}" type="slidenum">
               <a:rPr lang="en-US"/>
-              <a:t>‹N°›</a:t>
+              <a:t>‹#›</a:t>
             </a:fld>
             <a:endParaRPr/>
           </a:p>
@@ -4767,7 +4767,7 @@
             </a:pPr>
             <a:fld id="{00000000-1234-1234-1234-123412341234}" type="slidenum">
               <a:rPr lang="en-US"/>
-              <a:t>‹N°›</a:t>
+              <a:t>‹#›</a:t>
             </a:fld>
             <a:endParaRPr/>
           </a:p>
@@ -5341,7 +5341,7 @@
             </a:pPr>
             <a:fld id="{00000000-1234-1234-1234-123412341234}" type="slidenum">
               <a:rPr lang="en-US"/>
-              <a:t>‹N°›</a:t>
+              <a:t>‹#›</a:t>
             </a:fld>
             <a:endParaRPr/>
           </a:p>
@@ -6577,7 +6577,7 @@
             </a:pPr>
             <a:fld id="{00000000-1234-1234-1234-123412341234}" type="slidenum">
               <a:rPr lang="en-US"/>
-              <a:t>‹N°›</a:t>
+              <a:t>‹#›</a:t>
             </a:fld>
             <a:endParaRPr/>
           </a:p>
@@ -7069,7 +7069,7 @@
             </a:pPr>
             <a:fld id="{00000000-1234-1234-1234-123412341234}" type="slidenum">
               <a:rPr lang="en-US"/>
-              <a:t>‹N°›</a:t>
+              <a:t>‹#›</a:t>
             </a:fld>
             <a:endParaRPr/>
           </a:p>
@@ -7921,7 +7921,7 @@
             </a:pPr>
             <a:fld id="{00000000-1234-1234-1234-123412341234}" type="slidenum">
               <a:rPr lang="en-US"/>
-              <a:t>‹N°›</a:t>
+              <a:t>‹#›</a:t>
             </a:fld>
             <a:endParaRPr/>
           </a:p>
@@ -8897,7 +8897,7 @@
             </a:pPr>
             <a:fld id="{00000000-1234-1234-1234-123412341234}" type="slidenum">
               <a:rPr lang="en-US"/>
-              <a:t>‹N°›</a:t>
+              <a:t>‹#›</a:t>
             </a:fld>
             <a:endParaRPr/>
           </a:p>
@@ -9191,7 +9191,7 @@
             </a:pPr>
             <a:fld id="{00000000-1234-1234-1234-123412341234}" type="slidenum">
               <a:rPr lang="en-US"/>
-              <a:t>‹N°›</a:t>
+              <a:t>‹#›</a:t>
             </a:fld>
             <a:endParaRPr/>
           </a:p>
@@ -10399,7 +10399,7 @@
             </a:pPr>
             <a:fld id="{00000000-1234-1234-1234-123412341234}" type="slidenum">
               <a:rPr lang="en-US"/>
-              <a:t>‹N°›</a:t>
+              <a:t>‹#›</a:t>
             </a:fld>
             <a:endParaRPr/>
           </a:p>
@@ -11305,7 +11305,7 @@
             </a:pPr>
             <a:fld id="{00000000-1234-1234-1234-123412341234}" type="slidenum">
               <a:rPr lang="en-US"/>
-              <a:t>‹N°›</a:t>
+              <a:t>‹#›</a:t>
             </a:fld>
             <a:endParaRPr/>
           </a:p>
@@ -12030,7 +12030,7 @@
             </a:pPr>
             <a:fld id="{00000000-1234-1234-1234-123412341234}" type="slidenum">
               <a:rPr lang="en-US"/>
-              <a:t>‹N°›</a:t>
+              <a:t>‹#›</a:t>
             </a:fld>
             <a:endParaRPr/>
           </a:p>
@@ -12899,7 +12899,7 @@
             </a:pPr>
             <a:fld id="{00000000-1234-1234-1234-123412341234}" type="slidenum">
               <a:rPr lang="en-US"/>
-              <a:t>‹N°›</a:t>
+              <a:t>‹#›</a:t>
             </a:fld>
             <a:endParaRPr/>
           </a:p>
@@ -14016,7 +14016,7 @@
             </a:pPr>
             <a:fld id="{00000000-1234-1234-1234-123412341234}" type="slidenum">
               <a:rPr lang="en-US"/>
-              <a:t>‹N°›</a:t>
+              <a:t>‹#›</a:t>
             </a:fld>
             <a:endParaRPr/>
           </a:p>
@@ -14357,7 +14357,7 @@
             </a:pPr>
             <a:fld id="{00000000-1234-1234-1234-123412341234}" type="slidenum">
               <a:rPr lang="en-US"/>
-              <a:t>‹N°›</a:t>
+              <a:t>‹#›</a:t>
             </a:fld>
             <a:endParaRPr/>
           </a:p>
@@ -16439,7 +16439,7 @@
             </a:pPr>
             <a:fld id="{00000000-1234-1234-1234-123412341234}" type="slidenum">
               <a:rPr lang="en-US"/>
-              <a:t>‹N°›</a:t>
+              <a:t>‹#›</a:t>
             </a:fld>
             <a:endParaRPr/>
           </a:p>
@@ -18352,7 +18352,7 @@
         <p:fade/>
       </p:transition>
     </mc:Choice>
-    <mc:Fallback xmlns:ahyp="http://schemas.microsoft.com/office/drawing/2018/hyperlinkcolor" xmlns:p15="http://schemas.microsoft.com/office/powerpoint/2012/main" xmlns:com="http://schemas.openxmlformats.org/drawingml/2006/compatibility" xmlns:pvml="urn:schemas-microsoft-com:office:powerpoint" xmlns:v="urn:schemas-microsoft-com:vml" xmlns:o="urn:schemas-microsoft-com:office:office" xmlns:dgm="http://schemas.openxmlformats.org/drawingml/2006/diagram" xmlns:c="http://schemas.openxmlformats.org/drawingml/2006/chart" xmlns:mv="urn:schemas-microsoft-com:mac:vml" xmlns="">
+    <mc:Fallback xmlns="" xmlns:mv="urn:schemas-microsoft-com:mac:vml" xmlns:c="http://schemas.openxmlformats.org/drawingml/2006/chart" xmlns:dgm="http://schemas.openxmlformats.org/drawingml/2006/diagram" xmlns:o="urn:schemas-microsoft-com:office:office" xmlns:v="urn:schemas-microsoft-com:vml" xmlns:pvml="urn:schemas-microsoft-com:office:powerpoint" xmlns:com="http://schemas.openxmlformats.org/drawingml/2006/compatibility" xmlns:p15="http://schemas.microsoft.com/office/powerpoint/2012/main" xmlns:ahyp="http://schemas.microsoft.com/office/drawing/2018/hyperlinkcolor">
       <p:transition spd="slow">
         <p:fade/>
       </p:transition>
@@ -18687,7 +18687,7 @@
         <p:fade/>
       </p:transition>
     </mc:Choice>
-    <mc:Fallback xmlns:ahyp="http://schemas.microsoft.com/office/drawing/2018/hyperlinkcolor" xmlns:p15="http://schemas.microsoft.com/office/powerpoint/2012/main" xmlns:com="http://schemas.openxmlformats.org/drawingml/2006/compatibility" xmlns:pvml="urn:schemas-microsoft-com:office:powerpoint" xmlns:v="urn:schemas-microsoft-com:vml" xmlns:o="urn:schemas-microsoft-com:office:office" xmlns:dgm="http://schemas.openxmlformats.org/drawingml/2006/diagram" xmlns:c="http://schemas.openxmlformats.org/drawingml/2006/chart" xmlns:mv="urn:schemas-microsoft-com:mac:vml" xmlns="">
+    <mc:Fallback xmlns="" xmlns:mv="urn:schemas-microsoft-com:mac:vml" xmlns:c="http://schemas.openxmlformats.org/drawingml/2006/chart" xmlns:dgm="http://schemas.openxmlformats.org/drawingml/2006/diagram" xmlns:o="urn:schemas-microsoft-com:office:office" xmlns:v="urn:schemas-microsoft-com:vml" xmlns:pvml="urn:schemas-microsoft-com:office:powerpoint" xmlns:com="http://schemas.openxmlformats.org/drawingml/2006/compatibility" xmlns:p15="http://schemas.microsoft.com/office/powerpoint/2012/main" xmlns:ahyp="http://schemas.microsoft.com/office/drawing/2018/hyperlinkcolor">
       <p:transition spd="slow">
         <p:fade/>
       </p:transition>
@@ -19267,8 +19267,17 @@
           <a:p>
             <a:r>
               <a:rPr lang="fr-FR" dirty="0"/>
-              <a:t>Agenda</a:t>
+              <a:t>Agenda (Hackathon </a:t>
             </a:r>
+            <a:r>
+              <a:rPr lang="fr-FR" dirty="0" err="1"/>
+              <a:t>Focused</a:t>
+            </a:r>
+            <a:r>
+              <a:rPr lang="fr-FR"/>
+              <a:t>)</a:t>
+            </a:r>
+            <a:endParaRPr lang="fr-FR" dirty="0"/>
           </a:p>
         </p:txBody>
       </p:sp>

</xml_diff>